<commit_message>
Yet More Poster work
</commit_message>
<xml_diff>
--- a/docs/datascience_poster_v1.pptx
+++ b/docs/datascience_poster_v1.pptx
@@ -319,7 +319,7 @@
           <a:p>
             <a:fld id="{B85FB25A-B72B-064B-B05D-213ECC7E3CAA}" type="datetimeFigureOut">
               <a:rPr lang="en-US" smtClean="0"/>
-              <a:t>5/5/2015</a:t>
+              <a:t>5/6/2015</a:t>
             </a:fld>
             <a:endParaRPr lang="en-US"/>
           </a:p>
@@ -489,7 +489,7 @@
           <a:p>
             <a:fld id="{B85FB25A-B72B-064B-B05D-213ECC7E3CAA}" type="datetimeFigureOut">
               <a:rPr lang="en-US" smtClean="0"/>
-              <a:t>5/5/2015</a:t>
+              <a:t>5/6/2015</a:t>
             </a:fld>
             <a:endParaRPr lang="en-US"/>
           </a:p>
@@ -669,7 +669,7 @@
           <a:p>
             <a:fld id="{B85FB25A-B72B-064B-B05D-213ECC7E3CAA}" type="datetimeFigureOut">
               <a:rPr lang="en-US" smtClean="0"/>
-              <a:t>5/5/2015</a:t>
+              <a:t>5/6/2015</a:t>
             </a:fld>
             <a:endParaRPr lang="en-US"/>
           </a:p>
@@ -839,7 +839,7 @@
           <a:p>
             <a:fld id="{B85FB25A-B72B-064B-B05D-213ECC7E3CAA}" type="datetimeFigureOut">
               <a:rPr lang="en-US" smtClean="0"/>
-              <a:t>5/5/2015</a:t>
+              <a:t>5/6/2015</a:t>
             </a:fld>
             <a:endParaRPr lang="en-US"/>
           </a:p>
@@ -1085,7 +1085,7 @@
           <a:p>
             <a:fld id="{B85FB25A-B72B-064B-B05D-213ECC7E3CAA}" type="datetimeFigureOut">
               <a:rPr lang="en-US" smtClean="0"/>
-              <a:t>5/5/2015</a:t>
+              <a:t>5/6/2015</a:t>
             </a:fld>
             <a:endParaRPr lang="en-US"/>
           </a:p>
@@ -1373,7 +1373,7 @@
           <a:p>
             <a:fld id="{B85FB25A-B72B-064B-B05D-213ECC7E3CAA}" type="datetimeFigureOut">
               <a:rPr lang="en-US" smtClean="0"/>
-              <a:t>5/5/2015</a:t>
+              <a:t>5/6/2015</a:t>
             </a:fld>
             <a:endParaRPr lang="en-US"/>
           </a:p>
@@ -1795,7 +1795,7 @@
           <a:p>
             <a:fld id="{B85FB25A-B72B-064B-B05D-213ECC7E3CAA}" type="datetimeFigureOut">
               <a:rPr lang="en-US" smtClean="0"/>
-              <a:t>5/5/2015</a:t>
+              <a:t>5/6/2015</a:t>
             </a:fld>
             <a:endParaRPr lang="en-US"/>
           </a:p>
@@ -1913,7 +1913,7 @@
           <a:p>
             <a:fld id="{B85FB25A-B72B-064B-B05D-213ECC7E3CAA}" type="datetimeFigureOut">
               <a:rPr lang="en-US" smtClean="0"/>
-              <a:t>5/5/2015</a:t>
+              <a:t>5/6/2015</a:t>
             </a:fld>
             <a:endParaRPr lang="en-US"/>
           </a:p>
@@ -2008,7 +2008,7 @@
           <a:p>
             <a:fld id="{B85FB25A-B72B-064B-B05D-213ECC7E3CAA}" type="datetimeFigureOut">
               <a:rPr lang="en-US" smtClean="0"/>
-              <a:t>5/5/2015</a:t>
+              <a:t>5/6/2015</a:t>
             </a:fld>
             <a:endParaRPr lang="en-US"/>
           </a:p>
@@ -2285,7 +2285,7 @@
           <a:p>
             <a:fld id="{B85FB25A-B72B-064B-B05D-213ECC7E3CAA}" type="datetimeFigureOut">
               <a:rPr lang="en-US" smtClean="0"/>
-              <a:t>5/5/2015</a:t>
+              <a:t>5/6/2015</a:t>
             </a:fld>
             <a:endParaRPr lang="en-US"/>
           </a:p>
@@ -2538,7 +2538,7 @@
           <a:p>
             <a:fld id="{B85FB25A-B72B-064B-B05D-213ECC7E3CAA}" type="datetimeFigureOut">
               <a:rPr lang="en-US" smtClean="0"/>
-              <a:t>5/5/2015</a:t>
+              <a:t>5/6/2015</a:t>
             </a:fld>
             <a:endParaRPr lang="en-US"/>
           </a:p>
@@ -2751,7 +2751,7 @@
           <a:p>
             <a:fld id="{B85FB25A-B72B-064B-B05D-213ECC7E3CAA}" type="datetimeFigureOut">
               <a:rPr lang="en-US" smtClean="0"/>
-              <a:t>5/5/2015</a:t>
+              <a:t>5/6/2015</a:t>
             </a:fld>
             <a:endParaRPr lang="en-US"/>
           </a:p>
@@ -3165,13 +3165,13 @@
           <p:nvPr>
             <p:extLst>
               <p:ext uri="{D42A27DB-BD31-4B8C-83A1-F6EECF244321}">
-                <p14:modId xmlns:p14="http://schemas.microsoft.com/office/powerpoint/2010/main" val="2599515807"/>
+                <p14:modId xmlns:p14="http://schemas.microsoft.com/office/powerpoint/2010/main" val="898955525"/>
               </p:ext>
             </p:extLst>
           </p:nvPr>
         </p:nvGraphicFramePr>
         <p:xfrm>
-          <a:off x="-11066062" y="16227658"/>
+          <a:off x="38666920" y="20304985"/>
           <a:ext cx="51188813" cy="33033497"/>
         </p:xfrm>
         <a:graphic>
@@ -3231,7 +3231,7 @@
         </p:nvGrpSpPr>
         <p:grpSpPr>
           <a:xfrm>
-            <a:off x="-11029219" y="16736302"/>
+            <a:off x="38703763" y="20813629"/>
             <a:ext cx="25237572" cy="15514497"/>
             <a:chOff x="890736" y="5183505"/>
             <a:chExt cx="20073201" cy="12599000"/>
@@ -3339,13 +3339,6 @@
                 </a:rPr>
                 <a:t>Can You Trust Your Query Results?</a:t>
               </a:r>
-              <a:endParaRPr lang="en-US" sz="7733" b="1" dirty="0">
-                <a:ln>
-                  <a:solidFill>
-                    <a:schemeClr val="tx1"/>
-                  </a:solidFill>
-                </a:ln>
-              </a:endParaRPr>
             </a:p>
           </p:txBody>
         </p:sp>
@@ -3436,8 +3429,8 @@
         </p:blipFill>
         <p:spPr bwMode="auto">
           <a:xfrm>
-            <a:off x="24548514" y="292233"/>
-            <a:ext cx="3987316" cy="4593388"/>
+            <a:off x="25034240" y="292233"/>
+            <a:ext cx="3501590" cy="4033832"/>
           </a:xfrm>
           <a:prstGeom prst="rect">
             <a:avLst/>
@@ -3448,14 +3441,14 @@
           </a:ln>
           <a:extLst>
             <a:ext uri="{909E8E84-426E-40dd-AFC4-6F175D3DCCD1}">
-              <a14:hiddenFill xmlns:a14="http://schemas.microsoft.com/office/drawing/2010/main" xmlns="">
+              <a14:hiddenFill xmlns="" xmlns:a14="http://schemas.microsoft.com/office/drawing/2010/main">
                 <a:solidFill>
                   <a:srgbClr val="FFFFFF"/>
                 </a:solidFill>
               </a14:hiddenFill>
             </a:ext>
             <a:ext uri="{91240B29-F687-4f45-9708-019B960494DF}">
-              <a14:hiddenLine xmlns:a14="http://schemas.microsoft.com/office/drawing/2010/main" xmlns="" w="9525">
+              <a14:hiddenLine xmlns="" xmlns:a14="http://schemas.microsoft.com/office/drawing/2010/main" w="9525">
                 <a:solidFill>
                   <a:srgbClr val="000000"/>
                 </a:solidFill>
@@ -3475,7 +3468,7 @@
         </p:nvGrpSpPr>
         <p:grpSpPr>
           <a:xfrm>
-            <a:off x="14813772" y="16736302"/>
+            <a:off x="64546754" y="20813629"/>
             <a:ext cx="24952236" cy="15514497"/>
             <a:chOff x="1117512" y="5183505"/>
             <a:chExt cx="19846425" cy="12599000"/>
@@ -3583,13 +3576,6 @@
                 </a:rPr>
                 <a:t>Techniques From Biological Species Estimation </a:t>
               </a:r>
-              <a:endParaRPr lang="en-US" sz="7733" b="1" dirty="0">
-                <a:ln>
-                  <a:solidFill>
-                    <a:schemeClr val="tx1"/>
-                  </a:solidFill>
-                </a:ln>
-              </a:endParaRPr>
             </a:p>
           </p:txBody>
         </p:sp>
@@ -3602,7 +3588,7 @@
         </p:nvGrpSpPr>
         <p:grpSpPr>
           <a:xfrm>
-            <a:off x="-10714454" y="33126050"/>
+            <a:off x="39018528" y="37203377"/>
             <a:ext cx="24952452" cy="15514497"/>
             <a:chOff x="1117512" y="5183505"/>
             <a:chExt cx="19758962" cy="12599000"/>
@@ -3712,13 +3698,6 @@
                 </a:rPr>
                 <a:t>Impact of The Unknown on Aggregation Query</a:t>
               </a:r>
-              <a:endParaRPr lang="en-US" sz="7733" b="1" dirty="0">
-                <a:ln>
-                  <a:solidFill>
-                    <a:schemeClr val="tx1"/>
-                  </a:solidFill>
-                </a:ln>
-              </a:endParaRPr>
             </a:p>
           </p:txBody>
         </p:sp>
@@ -3731,7 +3710,7 @@
         </p:nvGrpSpPr>
         <p:grpSpPr>
           <a:xfrm>
-            <a:off x="14923737" y="33126050"/>
+            <a:off x="64656719" y="37203377"/>
             <a:ext cx="24842271" cy="15514497"/>
             <a:chOff x="1117512" y="5183505"/>
             <a:chExt cx="19758962" cy="12599000"/>
@@ -3839,13 +3818,6 @@
                 </a:rPr>
                 <a:t>Simulation Result and Future Work</a:t>
               </a:r>
-              <a:endParaRPr lang="en-US" sz="7733" b="1" dirty="0">
-                <a:ln>
-                  <a:solidFill>
-                    <a:schemeClr val="tx1"/>
-                  </a:solidFill>
-                </a:ln>
-              </a:endParaRPr>
             </a:p>
           </p:txBody>
         </p:sp>
@@ -3858,7 +3830,7 @@
         </p:nvCxnSpPr>
         <p:spPr>
           <a:xfrm>
-            <a:off x="-8257213" y="18335081"/>
+            <a:off x="41475769" y="22412408"/>
             <a:ext cx="19569911" cy="0"/>
           </a:xfrm>
           <a:prstGeom prst="line">
@@ -3893,7 +3865,7 @@
         </p:nvCxnSpPr>
         <p:spPr>
           <a:xfrm>
-            <a:off x="17368878" y="18326639"/>
+            <a:off x="67101860" y="22403966"/>
             <a:ext cx="19569911" cy="0"/>
           </a:xfrm>
           <a:prstGeom prst="line">
@@ -3928,7 +3900,7 @@
         </p:nvCxnSpPr>
         <p:spPr>
           <a:xfrm>
-            <a:off x="-7903579" y="34671589"/>
+            <a:off x="41829403" y="38748916"/>
             <a:ext cx="19569911" cy="0"/>
           </a:xfrm>
           <a:prstGeom prst="line">
@@ -3963,7 +3935,7 @@
         </p:nvCxnSpPr>
         <p:spPr>
           <a:xfrm>
-            <a:off x="17483684" y="34663147"/>
+            <a:off x="67216666" y="38740474"/>
             <a:ext cx="19569911" cy="0"/>
           </a:xfrm>
           <a:prstGeom prst="line">
@@ -4012,7 +3984,7 @@
         </p:blipFill>
         <p:spPr>
           <a:xfrm>
-            <a:off x="5810168" y="18994020"/>
+            <a:off x="55543150" y="23071347"/>
             <a:ext cx="5104771" cy="4083817"/>
           </a:xfrm>
           <a:prstGeom prst="rect">
@@ -4028,7 +4000,7 @@
         </p:nvSpPr>
         <p:spPr>
           <a:xfrm>
-            <a:off x="-7859972" y="18827235"/>
+            <a:off x="41873010" y="22904562"/>
             <a:ext cx="13486704" cy="5065812"/>
           </a:xfrm>
           <a:prstGeom prst="rightArrowCallout">
@@ -4088,7 +4060,7 @@
         </p:blipFill>
         <p:spPr>
           <a:xfrm>
-            <a:off x="-7110773" y="19428277"/>
+            <a:off x="42622209" y="23505604"/>
             <a:ext cx="2559413" cy="2559413"/>
           </a:xfrm>
           <a:prstGeom prst="rect">
@@ -4104,7 +4076,7 @@
         </p:nvSpPr>
         <p:spPr>
           <a:xfrm>
-            <a:off x="4998237" y="23296676"/>
+            <a:off x="54731219" y="27374003"/>
             <a:ext cx="6918713" cy="913199"/>
           </a:xfrm>
           <a:prstGeom prst="rect">
@@ -4137,7 +4109,6 @@
               <a:rPr lang="en-US" sz="2667" dirty="0"/>
               <a:t>on the east coast serve clam chowder?”</a:t>
             </a:r>
-            <a:endParaRPr lang="en-US" sz="2667" dirty="0"/>
           </a:p>
         </p:txBody>
       </p:sp>
@@ -4149,7 +4120,7 @@
         </p:nvSpPr>
         <p:spPr>
           <a:xfrm>
-            <a:off x="-7903579" y="24812805"/>
+            <a:off x="41829403" y="28890132"/>
             <a:ext cx="19021719" cy="2062103"/>
           </a:xfrm>
           <a:prstGeom prst="rect">
@@ -4199,7 +4170,7 @@
         </p:nvSpPr>
         <p:spPr>
           <a:xfrm>
-            <a:off x="-6146646" y="27363910"/>
+            <a:off x="43586336" y="31441237"/>
             <a:ext cx="15689023" cy="2350249"/>
           </a:xfrm>
           <a:prstGeom prst="roundRect">
@@ -4240,7 +4211,7 @@
         </p:nvSpPr>
         <p:spPr>
           <a:xfrm>
-            <a:off x="-5540455" y="27291264"/>
+            <a:off x="44192527" y="31368591"/>
             <a:ext cx="14588932" cy="2062359"/>
           </a:xfrm>
           <a:prstGeom prst="rect">
@@ -4289,7 +4260,7 @@
         </p:nvSpPr>
         <p:spPr>
           <a:xfrm>
-            <a:off x="-8116101" y="30674839"/>
+            <a:off x="41616881" y="34752166"/>
             <a:ext cx="19923543" cy="830997"/>
           </a:xfrm>
           <a:prstGeom prst="rect">
@@ -4320,7 +4291,7 @@
         </p:nvSpPr>
         <p:spPr>
           <a:xfrm>
-            <a:off x="80103" y="29714159"/>
+            <a:off x="49813085" y="33791486"/>
             <a:ext cx="3347375" cy="590316"/>
           </a:xfrm>
           <a:prstGeom prst="downArrow">
@@ -4358,7 +4329,7 @@
         </p:nvSpPr>
         <p:spPr>
           <a:xfrm>
-            <a:off x="28043347" y="36746408"/>
+            <a:off x="77776329" y="40823735"/>
             <a:ext cx="10623573" cy="7848302"/>
           </a:xfrm>
           <a:prstGeom prst="rect">
@@ -4423,7 +4394,7 @@
         </p:nvSpPr>
         <p:spPr>
           <a:xfrm>
-            <a:off x="-6850236" y="35967383"/>
+            <a:off x="42882746" y="40044710"/>
             <a:ext cx="6930340" cy="748988"/>
           </a:xfrm>
           <a:prstGeom prst="rect">
@@ -4449,7 +4420,7 @@
         </p:nvSpPr>
         <p:spPr>
           <a:xfrm>
-            <a:off x="-7536146" y="36246103"/>
+            <a:off x="42196836" y="40323430"/>
             <a:ext cx="6720284" cy="3539174"/>
           </a:xfrm>
           <a:prstGeom prst="rect">
@@ -4501,7 +4472,6 @@
               <a:rPr lang="en-US" sz="3733" i="1" dirty="0"/>
               <a:t> = ‘Yes’;</a:t>
             </a:r>
-            <a:endParaRPr lang="en-US" sz="3733" i="1" dirty="0"/>
           </a:p>
         </p:txBody>
       </p:sp>
@@ -4514,13 +4484,13 @@
           <p:nvPr>
             <p:extLst>
               <p:ext uri="{D42A27DB-BD31-4B8C-83A1-F6EECF244321}">
-                <p14:modId xmlns:p14="http://schemas.microsoft.com/office/powerpoint/2010/main" val="3178243295"/>
+                <p14:modId xmlns:p14="http://schemas.microsoft.com/office/powerpoint/2010/main" val="826058615"/>
               </p:ext>
             </p:extLst>
           </p:nvPr>
         </p:nvGraphicFramePr>
         <p:xfrm>
-          <a:off x="2342934" y="35760881"/>
+          <a:off x="52075916" y="39838208"/>
           <a:ext cx="9464508" cy="4133021"/>
         </p:xfrm>
         <a:graphic>
@@ -4894,13 +4864,13 @@
           <p:nvPr>
             <p:extLst>
               <p:ext uri="{D42A27DB-BD31-4B8C-83A1-F6EECF244321}">
-                <p14:modId xmlns:p14="http://schemas.microsoft.com/office/powerpoint/2010/main" val="1677055951"/>
+                <p14:modId xmlns:p14="http://schemas.microsoft.com/office/powerpoint/2010/main" val="2991644435"/>
               </p:ext>
             </p:extLst>
           </p:nvPr>
         </p:nvGraphicFramePr>
         <p:xfrm>
-          <a:off x="2342936" y="40862246"/>
+          <a:off x="52075918" y="44939573"/>
           <a:ext cx="9464508" cy="1621793"/>
         </p:xfrm>
         <a:graphic>
@@ -5083,7 +5053,7 @@
         </p:nvSpPr>
         <p:spPr>
           <a:xfrm>
-            <a:off x="2685065" y="35060415"/>
+            <a:off x="52418047" y="39137742"/>
             <a:ext cx="8792833" cy="666786"/>
           </a:xfrm>
           <a:prstGeom prst="rect">
@@ -5102,7 +5072,6 @@
               <a:rPr lang="en-US" sz="3733" i="1" dirty="0"/>
               <a:t>Table. Known</a:t>
             </a:r>
-            <a:endParaRPr lang="en-US" sz="3733" i="1" dirty="0"/>
           </a:p>
         </p:txBody>
       </p:sp>
@@ -5114,7 +5083,7 @@
         </p:nvSpPr>
         <p:spPr>
           <a:xfrm>
-            <a:off x="2708941" y="40164618"/>
+            <a:off x="52441923" y="44241945"/>
             <a:ext cx="8792833" cy="666786"/>
           </a:xfrm>
           <a:prstGeom prst="rect">
@@ -5133,7 +5102,6 @@
               <a:rPr lang="en-US" sz="3733" i="1" dirty="0"/>
               <a:t>Table. Unknown</a:t>
             </a:r>
-            <a:endParaRPr lang="en-US" sz="3733" i="1" dirty="0"/>
           </a:p>
         </p:txBody>
       </p:sp>
@@ -5145,7 +5113,7 @@
         </p:nvSpPr>
         <p:spPr>
           <a:xfrm>
-            <a:off x="80103" y="37371618"/>
+            <a:off x="49813085" y="41448945"/>
             <a:ext cx="1333995" cy="1486837"/>
           </a:xfrm>
           <a:prstGeom prst="rightArrow">
@@ -5183,7 +5151,7 @@
         </p:nvSpPr>
         <p:spPr>
           <a:xfrm>
-            <a:off x="-8056310" y="40048747"/>
+            <a:off x="41676672" y="44126074"/>
             <a:ext cx="7398111" cy="666786"/>
           </a:xfrm>
           <a:prstGeom prst="rect">
@@ -5206,7 +5174,6 @@
               <a:rPr lang="en-US" sz="3733" i="1" dirty="0"/>
               <a:t>: Aggregation Sum Query </a:t>
             </a:r>
-            <a:endParaRPr lang="en-US" sz="3733" i="1" dirty="0"/>
           </a:p>
         </p:txBody>
       </p:sp>
@@ -5218,7 +5185,7 @@
         </p:nvSpPr>
         <p:spPr>
           <a:xfrm>
-            <a:off x="16026589" y="35593280"/>
+            <a:off x="65759571" y="39670607"/>
             <a:ext cx="11463895" cy="9948089"/>
           </a:xfrm>
           <a:prstGeom prst="roundRect">
@@ -5273,7 +5240,7 @@
         </p:blipFill>
         <p:spPr>
           <a:xfrm>
-            <a:off x="16264253" y="36388689"/>
+            <a:off x="65997235" y="40466016"/>
             <a:ext cx="10837333" cy="8128000"/>
           </a:xfrm>
           <a:prstGeom prst="rect">
@@ -5289,7 +5256,7 @@
         </p:nvSpPr>
         <p:spPr>
           <a:xfrm>
-            <a:off x="-5762008" y="43102485"/>
+            <a:off x="43970974" y="47179812"/>
             <a:ext cx="15687592" cy="2284551"/>
           </a:xfrm>
           <a:prstGeom prst="roundRect">
@@ -5331,20 +5298,20 @@
           <p:nvPr>
             <p:extLst>
               <p:ext uri="{D42A27DB-BD31-4B8C-83A1-F6EECF244321}">
-                <p14:modId xmlns:p14="http://schemas.microsoft.com/office/powerpoint/2010/main" val="572988327"/>
+                <p14:modId xmlns:p14="http://schemas.microsoft.com/office/powerpoint/2010/main" val="1310357342"/>
               </p:ext>
             </p:extLst>
           </p:nvPr>
         </p:nvGraphicFramePr>
         <p:xfrm>
-          <a:off x="-4089279" y="43315508"/>
+          <a:off x="45643703" y="47392835"/>
           <a:ext cx="12464995" cy="1940305"/>
         </p:xfrm>
         <a:graphic>
           <a:graphicData uri="http://schemas.openxmlformats.org/presentationml/2006/ole">
             <mc:AlternateContent xmlns:mc="http://schemas.openxmlformats.org/markup-compatibility/2006">
               <mc:Choice xmlns:v="urn:schemas-microsoft-com:vml" Requires="v">
-                <p:oleObj spid="_x0000_s1060" name="Equation" r:id="rId8" imgW="2692400" imgH="419100" progId="Equation.3">
+                <p:oleObj spid="_x0000_s1064" name="Equation" r:id="rId8" imgW="2692400" imgH="419100" progId="Equation.3">
                   <p:embed/>
                 </p:oleObj>
               </mc:Choice>
@@ -5365,7 +5332,7 @@
                     </p:blipFill>
                     <p:spPr>
                       <a:xfrm>
-                        <a:off x="-4089279" y="43315508"/>
+                        <a:off x="45643703" y="47392835"/>
                         <a:ext cx="12464995" cy="1940305"/>
                       </a:xfrm>
                       <a:prstGeom prst="rect">
@@ -5401,7 +5368,7 @@
         </p:blipFill>
         <p:spPr>
           <a:xfrm>
-            <a:off x="-7018775" y="18827236"/>
+            <a:off x="42714207" y="22904563"/>
             <a:ext cx="2693521" cy="1513417"/>
           </a:xfrm>
           <a:prstGeom prst="rect">
@@ -5431,7 +5398,7 @@
         </p:blipFill>
         <p:spPr>
           <a:xfrm>
-            <a:off x="-7459303" y="21251415"/>
+            <a:off x="42273679" y="25328742"/>
             <a:ext cx="3794817" cy="1051824"/>
           </a:xfrm>
           <a:prstGeom prst="rect">
@@ -5461,7 +5428,7 @@
         </p:blipFill>
         <p:spPr>
           <a:xfrm>
-            <a:off x="-7425436" y="22442087"/>
+            <a:off x="42307546" y="26519414"/>
             <a:ext cx="3490601" cy="1085385"/>
           </a:xfrm>
           <a:prstGeom prst="rect">
@@ -5477,7 +5444,7 @@
         </p:nvSpPr>
         <p:spPr>
           <a:xfrm>
-            <a:off x="-1499382" y="20147415"/>
+            <a:off x="48233600" y="24224742"/>
             <a:ext cx="2201333" cy="2155825"/>
           </a:xfrm>
           <a:prstGeom prst="can">
@@ -5516,7 +5483,7 @@
         </p:nvSpPr>
         <p:spPr>
           <a:xfrm>
-            <a:off x="-1728695" y="20677687"/>
+            <a:off x="48004287" y="24755014"/>
             <a:ext cx="2599979" cy="1241237"/>
           </a:xfrm>
           <a:prstGeom prst="rect">
@@ -5542,7 +5509,6 @@
               <a:rPr lang="en-US" sz="3733" dirty="0"/>
               <a:t>Data Set</a:t>
             </a:r>
-            <a:endParaRPr lang="en-US" sz="3733" dirty="0"/>
           </a:p>
         </p:txBody>
       </p:sp>
@@ -5554,7 +5520,7 @@
         </p:nvSpPr>
         <p:spPr>
           <a:xfrm>
-            <a:off x="-7560903" y="19095622"/>
+            <a:off x="42172079" y="23172949"/>
             <a:ext cx="3794817" cy="861561"/>
           </a:xfrm>
           <a:prstGeom prst="rect">
@@ -5593,7 +5559,7 @@
         </p:nvSpPr>
         <p:spPr>
           <a:xfrm>
-            <a:off x="-7557956" y="20229700"/>
+            <a:off x="42175026" y="24307027"/>
             <a:ext cx="3794817" cy="861561"/>
           </a:xfrm>
           <a:prstGeom prst="rect">
@@ -5632,7 +5598,7 @@
         </p:nvSpPr>
         <p:spPr>
           <a:xfrm>
-            <a:off x="-7560903" y="21294462"/>
+            <a:off x="42172079" y="25371789"/>
             <a:ext cx="3794817" cy="861561"/>
           </a:xfrm>
           <a:prstGeom prst="rect">
@@ -5671,7 +5637,7 @@
         </p:nvSpPr>
         <p:spPr>
           <a:xfrm>
-            <a:off x="-7560903" y="22479286"/>
+            <a:off x="42172079" y="26556613"/>
             <a:ext cx="3794817" cy="861561"/>
           </a:xfrm>
           <a:prstGeom prst="rect">
@@ -5712,7 +5678,7 @@
         </p:nvCxnSpPr>
         <p:spPr>
           <a:xfrm>
-            <a:off x="-3766086" y="19526402"/>
+            <a:off x="45966896" y="23603729"/>
             <a:ext cx="2037392" cy="1151285"/>
           </a:xfrm>
           <a:prstGeom prst="straightConnector1">
@@ -5747,7 +5713,7 @@
         </p:nvCxnSpPr>
         <p:spPr>
           <a:xfrm>
-            <a:off x="-3763140" y="20660481"/>
+            <a:off x="45969842" y="24737808"/>
             <a:ext cx="2034445" cy="430780"/>
           </a:xfrm>
           <a:prstGeom prst="straightConnector1">
@@ -5783,7 +5749,7 @@
         </p:nvCxnSpPr>
         <p:spPr>
           <a:xfrm flipV="1">
-            <a:off x="-3766086" y="21298306"/>
+            <a:off x="45966896" y="25375633"/>
             <a:ext cx="2037391" cy="426937"/>
           </a:xfrm>
           <a:prstGeom prst="straightConnector1">
@@ -5818,7 +5784,7 @@
         </p:nvCxnSpPr>
         <p:spPr>
           <a:xfrm flipV="1">
-            <a:off x="-3766086" y="21725242"/>
+            <a:off x="45966896" y="25802569"/>
             <a:ext cx="2037392" cy="1184824"/>
           </a:xfrm>
           <a:prstGeom prst="straightConnector1">
@@ -5851,7 +5817,7 @@
         </p:nvSpPr>
         <p:spPr>
           <a:xfrm rot="1660431">
-            <a:off x="-3376786" y="19515124"/>
+            <a:off x="46356196" y="23592451"/>
             <a:ext cx="1756081" cy="584775"/>
           </a:xfrm>
           <a:prstGeom prst="rect">
@@ -5869,7 +5835,6 @@
               <a:rPr lang="en-US" sz="3200" dirty="0"/>
               <a:t>Source A</a:t>
             </a:r>
-            <a:endParaRPr lang="en-US" sz="3200" dirty="0"/>
           </a:p>
         </p:txBody>
       </p:sp>
@@ -5881,7 +5846,7 @@
         </p:nvSpPr>
         <p:spPr>
           <a:xfrm rot="832590">
-            <a:off x="-3499267" y="20292052"/>
+            <a:off x="46233715" y="24369379"/>
             <a:ext cx="1756081" cy="584775"/>
           </a:xfrm>
           <a:prstGeom prst="rect">
@@ -5899,7 +5864,6 @@
               <a:rPr lang="en-US" sz="3200" dirty="0"/>
               <a:t>Source B</a:t>
             </a:r>
-            <a:endParaRPr lang="en-US" sz="3200" dirty="0"/>
           </a:p>
         </p:txBody>
       </p:sp>
@@ -5911,7 +5875,7 @@
         </p:nvSpPr>
         <p:spPr>
           <a:xfrm rot="20853550">
-            <a:off x="-3616298" y="20996708"/>
+            <a:off x="46116684" y="25074035"/>
             <a:ext cx="1756081" cy="584775"/>
           </a:xfrm>
           <a:prstGeom prst="rect">
@@ -5929,7 +5893,6 @@
               <a:rPr lang="en-US" sz="3200" dirty="0"/>
               <a:t>Source C</a:t>
             </a:r>
-            <a:endParaRPr lang="en-US" sz="3200" dirty="0"/>
           </a:p>
         </p:txBody>
       </p:sp>
@@ -5941,7 +5904,7 @@
         </p:nvSpPr>
         <p:spPr>
           <a:xfrm rot="19900116">
-            <a:off x="-3697484" y="21805712"/>
+            <a:off x="46035498" y="25883039"/>
             <a:ext cx="1756081" cy="584775"/>
           </a:xfrm>
           <a:prstGeom prst="rect">
@@ -5959,7 +5922,6 @@
               <a:rPr lang="en-US" sz="3200" dirty="0"/>
               <a:t>Source D</a:t>
             </a:r>
-            <a:endParaRPr lang="en-US" sz="3200" dirty="0"/>
           </a:p>
         </p:txBody>
       </p:sp>
@@ -5979,7 +5941,7 @@
         </p:blipFill>
         <p:spPr>
           <a:xfrm>
-            <a:off x="1926066" y="20304985"/>
+            <a:off x="51659048" y="24382312"/>
             <a:ext cx="1111596" cy="1866024"/>
           </a:xfrm>
           <a:prstGeom prst="rect">
@@ -5995,7 +5957,7 @@
         </p:nvSpPr>
         <p:spPr>
           <a:xfrm>
-            <a:off x="876200" y="21646712"/>
+            <a:off x="50609182" y="25724039"/>
             <a:ext cx="1268452" cy="577997"/>
           </a:xfrm>
           <a:prstGeom prst="curvedUpArrow">
@@ -6037,7 +5999,7 @@
         </p:nvSpPr>
         <p:spPr>
           <a:xfrm rot="10800000">
-            <a:off x="876200" y="19912470"/>
+            <a:off x="50609182" y="23989797"/>
             <a:ext cx="1268452" cy="577997"/>
           </a:xfrm>
           <a:prstGeom prst="curvedUpArrow">
@@ -6079,7 +6041,7 @@
         </p:nvSpPr>
         <p:spPr>
           <a:xfrm>
-            <a:off x="681927" y="19163355"/>
+            <a:off x="50414909" y="23240682"/>
             <a:ext cx="1756081" cy="584775"/>
           </a:xfrm>
           <a:prstGeom prst="rect">
@@ -6098,7 +6060,6 @@
               <a:rPr lang="en-US" sz="3200" dirty="0"/>
               <a:t>Query</a:t>
             </a:r>
-            <a:endParaRPr lang="en-US" sz="3200" dirty="0"/>
           </a:p>
         </p:txBody>
       </p:sp>
@@ -6110,7 +6071,7 @@
         </p:nvSpPr>
         <p:spPr>
           <a:xfrm>
-            <a:off x="648060" y="22273029"/>
+            <a:off x="50381042" y="26350356"/>
             <a:ext cx="1756081" cy="584775"/>
           </a:xfrm>
           <a:prstGeom prst="rect">
@@ -6129,7 +6090,6 @@
               <a:rPr lang="en-US" sz="3200" dirty="0"/>
               <a:t>Answer</a:t>
             </a:r>
-            <a:endParaRPr lang="en-US" sz="3200" dirty="0"/>
           </a:p>
         </p:txBody>
       </p:sp>
@@ -6141,7 +6101,7 @@
         </p:nvSpPr>
         <p:spPr>
           <a:xfrm>
-            <a:off x="-8533121" y="23295765"/>
+            <a:off x="41199861" y="27373092"/>
             <a:ext cx="13057224" cy="666786"/>
           </a:xfrm>
           <a:prstGeom prst="rect">
@@ -6160,7 +6120,6 @@
               <a:rPr lang="en-US" sz="3733" i="1" dirty="0"/>
               <a:t>Fig. Typical Analytics Process Pipeline</a:t>
             </a:r>
-            <a:endParaRPr lang="en-US" sz="3733" i="1" dirty="0"/>
           </a:p>
         </p:txBody>
       </p:sp>
@@ -6172,7 +6131,7 @@
         </p:nvSpPr>
         <p:spPr>
           <a:xfrm>
-            <a:off x="13963028" y="32052189"/>
+            <a:off x="63696010" y="36129516"/>
             <a:ext cx="683068" cy="584775"/>
           </a:xfrm>
           <a:prstGeom prst="rect">
@@ -6194,11 +6153,6 @@
               </a:rPr>
               <a:t>1</a:t>
             </a:r>
-            <a:endParaRPr lang="en-US" sz="3200" dirty="0">
-              <a:solidFill>
-                <a:schemeClr val="accent1"/>
-              </a:solidFill>
-            </a:endParaRPr>
           </a:p>
         </p:txBody>
       </p:sp>
@@ -6210,7 +6164,7 @@
         </p:nvSpPr>
         <p:spPr>
           <a:xfrm>
-            <a:off x="14628564" y="32052189"/>
+            <a:off x="64361546" y="36129516"/>
             <a:ext cx="756539" cy="584775"/>
           </a:xfrm>
           <a:prstGeom prst="rect">
@@ -6232,11 +6186,6 @@
               </a:rPr>
               <a:t>2</a:t>
             </a:r>
-            <a:endParaRPr lang="en-US" sz="3200" dirty="0">
-              <a:solidFill>
-                <a:schemeClr val="accent1"/>
-              </a:solidFill>
-            </a:endParaRPr>
           </a:p>
         </p:txBody>
       </p:sp>
@@ -6248,7 +6197,7 @@
         </p:nvSpPr>
         <p:spPr>
           <a:xfrm>
-            <a:off x="13966135" y="32738969"/>
+            <a:off x="63699117" y="36816296"/>
             <a:ext cx="756539" cy="584775"/>
           </a:xfrm>
           <a:prstGeom prst="rect">
@@ -6270,11 +6219,6 @@
               </a:rPr>
               <a:t>3</a:t>
             </a:r>
-            <a:endParaRPr lang="en-US" sz="3200" dirty="0">
-              <a:solidFill>
-                <a:schemeClr val="accent1"/>
-              </a:solidFill>
-            </a:endParaRPr>
           </a:p>
         </p:txBody>
       </p:sp>
@@ -6286,7 +6230,7 @@
         </p:nvSpPr>
         <p:spPr>
           <a:xfrm>
-            <a:off x="14640796" y="32738969"/>
+            <a:off x="64373778" y="36816296"/>
             <a:ext cx="756539" cy="584775"/>
           </a:xfrm>
           <a:prstGeom prst="rect">
@@ -6308,11 +6252,6 @@
               </a:rPr>
               <a:t>4</a:t>
             </a:r>
-            <a:endParaRPr lang="en-US" sz="3200" dirty="0">
-              <a:solidFill>
-                <a:schemeClr val="accent1"/>
-              </a:solidFill>
-            </a:endParaRPr>
           </a:p>
         </p:txBody>
       </p:sp>
@@ -6324,7 +6263,7 @@
         </p:nvCxnSpPr>
         <p:spPr>
           <a:xfrm>
-            <a:off x="14499074" y="32052189"/>
+            <a:off x="64232056" y="36129516"/>
             <a:ext cx="0" cy="1262488"/>
           </a:xfrm>
           <a:prstGeom prst="line">
@@ -6354,7 +6293,7 @@
         </p:nvCxnSpPr>
         <p:spPr>
           <a:xfrm>
-            <a:off x="13809817" y="32700378"/>
+            <a:off x="63542799" y="36777705"/>
             <a:ext cx="1283253" cy="0"/>
           </a:xfrm>
           <a:prstGeom prst="line">
@@ -6384,7 +6323,7 @@
         </p:nvSpPr>
         <p:spPr>
           <a:xfrm>
-            <a:off x="15982272" y="18772693"/>
+            <a:off x="65715254" y="22850020"/>
             <a:ext cx="22516272" cy="9646707"/>
           </a:xfrm>
           <a:prstGeom prst="roundRect">
@@ -6437,7 +6376,7 @@
         </p:nvGrpSpPr>
         <p:grpSpPr>
           <a:xfrm>
-            <a:off x="16163110" y="21240364"/>
+            <a:off x="65896092" y="25317691"/>
             <a:ext cx="7778271" cy="6220405"/>
             <a:chOff x="21627854" y="7713297"/>
             <a:chExt cx="5833703" cy="4665304"/>
@@ -6949,7 +6888,6 @@
                   <a:rPr lang="en-US" sz="5333" dirty="0"/>
                   <a:t>A</a:t>
                 </a:r>
-                <a:endParaRPr lang="en-US" sz="5333" dirty="0"/>
               </a:p>
             </p:txBody>
           </p:sp>
@@ -7189,7 +7127,6 @@
                   <a:rPr lang="en-US" sz="4800" dirty="0"/>
                   <a:t>B</a:t>
                 </a:r>
-                <a:endParaRPr lang="en-US" sz="4800" dirty="0"/>
               </a:p>
             </p:txBody>
           </p:sp>
@@ -7429,7 +7366,6 @@
                   <a:rPr lang="en-US" sz="5867" dirty="0"/>
                   <a:t>C</a:t>
                 </a:r>
-                <a:endParaRPr lang="en-US" sz="5867" dirty="0"/>
               </a:p>
             </p:txBody>
           </p:sp>
@@ -7669,7 +7605,6 @@
                   <a:rPr lang="en-US" sz="4800" dirty="0"/>
                   <a:t>D</a:t>
                 </a:r>
-                <a:endParaRPr lang="en-US" sz="4800" dirty="0"/>
               </a:p>
             </p:txBody>
           </p:sp>
@@ -7909,7 +7844,6 @@
                   <a:rPr lang="en-US" sz="2400" dirty="0"/>
                   <a:t>E</a:t>
                 </a:r>
-                <a:endParaRPr lang="en-US" sz="2400" dirty="0"/>
               </a:p>
             </p:txBody>
           </p:sp>
@@ -8149,7 +8083,6 @@
                   <a:rPr lang="en-US" sz="2400" dirty="0"/>
                   <a:t>F</a:t>
                 </a:r>
-                <a:endParaRPr lang="en-US" sz="2400" dirty="0"/>
               </a:p>
             </p:txBody>
           </p:sp>
@@ -8389,7 +8322,6 @@
                   <a:rPr lang="en-US" sz="2400" dirty="0"/>
                   <a:t>O</a:t>
                 </a:r>
-                <a:endParaRPr lang="en-US" sz="2400" dirty="0"/>
               </a:p>
             </p:txBody>
           </p:sp>
@@ -8629,7 +8561,6 @@
                   <a:rPr lang="en-US" sz="2400" dirty="0"/>
                   <a:t>G</a:t>
                 </a:r>
-                <a:endParaRPr lang="en-US" sz="2400" dirty="0"/>
               </a:p>
             </p:txBody>
           </p:sp>
@@ -8869,7 +8800,6 @@
                   <a:rPr lang="en-US" sz="3733" dirty="0"/>
                   <a:t>H</a:t>
                 </a:r>
-                <a:endParaRPr lang="en-US" sz="3733" dirty="0"/>
               </a:p>
             </p:txBody>
           </p:sp>
@@ -9109,7 +9039,6 @@
                   <a:rPr lang="en-US" sz="3733" dirty="0"/>
                   <a:t>I</a:t>
                 </a:r>
-                <a:endParaRPr lang="en-US" sz="3733" dirty="0"/>
               </a:p>
             </p:txBody>
           </p:sp>
@@ -9349,7 +9278,6 @@
                   <a:rPr lang="en-US" sz="2133" dirty="0"/>
                   <a:t>R</a:t>
                 </a:r>
-                <a:endParaRPr lang="en-US" sz="2133" dirty="0"/>
               </a:p>
             </p:txBody>
           </p:sp>
@@ -9589,7 +9517,6 @@
                   <a:rPr lang="en-US" sz="2133" dirty="0"/>
                   <a:t>N</a:t>
                 </a:r>
-                <a:endParaRPr lang="en-US" sz="2133" dirty="0"/>
               </a:p>
             </p:txBody>
           </p:sp>
@@ -9829,7 +9756,6 @@
                   <a:rPr lang="en-US" sz="5867" dirty="0"/>
                   <a:t>Z</a:t>
                 </a:r>
-                <a:endParaRPr lang="en-US" sz="5867" dirty="0"/>
               </a:p>
             </p:txBody>
           </p:sp>
@@ -10069,7 +9995,6 @@
                   <a:rPr lang="en-US" sz="2133" dirty="0"/>
                   <a:t>J</a:t>
                 </a:r>
-                <a:endParaRPr lang="en-US" sz="2133" dirty="0"/>
               </a:p>
             </p:txBody>
           </p:sp>
@@ -10309,7 +10234,6 @@
                   <a:rPr lang="en-US" sz="2133" dirty="0"/>
                   <a:t>K</a:t>
                 </a:r>
-                <a:endParaRPr lang="en-US" sz="2133" dirty="0"/>
               </a:p>
             </p:txBody>
           </p:sp>
@@ -10549,7 +10473,6 @@
                   <a:rPr lang="en-US" sz="2133" dirty="0"/>
                   <a:t>L</a:t>
                 </a:r>
-                <a:endParaRPr lang="en-US" sz="2133" dirty="0"/>
               </a:p>
             </p:txBody>
           </p:sp>
@@ -10789,7 +10712,6 @@
                   <a:rPr lang="en-US" sz="2133" dirty="0"/>
                   <a:t>M</a:t>
                 </a:r>
-                <a:endParaRPr lang="en-US" sz="2133" dirty="0"/>
               </a:p>
             </p:txBody>
           </p:sp>
@@ -11055,7 +10977,6 @@
                 <a:rPr lang="en-US" sz="2400" dirty="0"/>
                 <a:t>}</a:t>
               </a:r>
-              <a:endParaRPr lang="en-US" sz="2400" dirty="0"/>
             </a:p>
           </p:txBody>
         </p:sp>
@@ -11101,7 +11022,7 @@
         </p:nvSpPr>
         <p:spPr>
           <a:xfrm>
-            <a:off x="19817473" y="27721772"/>
+            <a:off x="69550455" y="31799099"/>
             <a:ext cx="15132593" cy="666786"/>
           </a:xfrm>
           <a:prstGeom prst="rect">
@@ -11120,7 +11041,6 @@
               <a:rPr lang="en-US" sz="3733" i="1" dirty="0"/>
               <a:t>Fig. sampling model for species estimation / unknown data items estimation</a:t>
             </a:r>
-            <a:endParaRPr lang="en-US" sz="3733" i="1" dirty="0"/>
           </a:p>
         </p:txBody>
       </p:sp>
@@ -11132,7 +11052,7 @@
         </p:nvGrpSpPr>
         <p:grpSpPr>
           <a:xfrm>
-            <a:off x="23004014" y="19168830"/>
+            <a:off x="72736996" y="23246157"/>
             <a:ext cx="8452688" cy="601688"/>
             <a:chOff x="35201755" y="10836676"/>
             <a:chExt cx="7242026" cy="498594"/>
@@ -11908,7 +11828,6 @@
                   <a:rPr lang="en-US" sz="1600" b="1" i="1" dirty="0"/>
                   <a:t>Population</a:t>
                 </a:r>
-                <a:endParaRPr lang="en-US" sz="1600" b="1" i="1" dirty="0"/>
               </a:p>
             </p:txBody>
           </p:sp>
@@ -12156,7 +12075,6 @@
                   <a:rPr lang="en-US" sz="1600" b="1" i="1" dirty="0"/>
                   <a:t>Sample</a:t>
                 </a:r>
-                <a:endParaRPr lang="en-US" sz="1600" b="1" i="1" dirty="0"/>
               </a:p>
             </p:txBody>
           </p:sp>
@@ -12398,7 +12316,6 @@
                 <a:rPr lang="en-US" sz="1600" b="1" i="1" dirty="0"/>
                 <a:t>Sampling with replacement</a:t>
               </a:r>
-              <a:endParaRPr lang="en-US" sz="1600" b="1" i="1" dirty="0"/>
             </a:p>
           </p:txBody>
         </p:sp>
@@ -12715,7 +12632,6 @@
                 <a:rPr lang="en-US" sz="1600" b="1" i="1" dirty="0"/>
                 <a:t>replacement</a:t>
               </a:r>
-              <a:endParaRPr lang="en-US" sz="1600" b="1" i="1" dirty="0"/>
             </a:p>
           </p:txBody>
         </p:sp>
@@ -12728,7 +12644,7 @@
         </p:nvGrpSpPr>
         <p:grpSpPr>
           <a:xfrm>
-            <a:off x="30318978" y="21138373"/>
+            <a:off x="80051960" y="25215700"/>
             <a:ext cx="7778271" cy="6241312"/>
             <a:chOff x="29502098" y="7711514"/>
             <a:chExt cx="5833703" cy="4680984"/>
@@ -13240,7 +13156,6 @@
                   <a:rPr lang="en-US" sz="5333" dirty="0"/>
                   <a:t>A</a:t>
                 </a:r>
-                <a:endParaRPr lang="en-US" sz="5333" dirty="0"/>
               </a:p>
             </p:txBody>
           </p:sp>
@@ -13480,7 +13395,6 @@
                   <a:rPr lang="en-US" sz="4800" dirty="0"/>
                   <a:t>B</a:t>
                 </a:r>
-                <a:endParaRPr lang="en-US" sz="4800" dirty="0"/>
               </a:p>
             </p:txBody>
           </p:sp>
@@ -13720,7 +13634,6 @@
                   <a:rPr lang="en-US" sz="5867" dirty="0"/>
                   <a:t>C</a:t>
                 </a:r>
-                <a:endParaRPr lang="en-US" sz="5867" dirty="0"/>
               </a:p>
             </p:txBody>
           </p:sp>
@@ -13960,7 +13873,6 @@
                   <a:rPr lang="en-US" sz="4800" dirty="0"/>
                   <a:t>D</a:t>
                 </a:r>
-                <a:endParaRPr lang="en-US" sz="4800" dirty="0"/>
               </a:p>
             </p:txBody>
           </p:sp>
@@ -14200,7 +14112,6 @@
                   <a:rPr lang="en-US" sz="2400" dirty="0"/>
                   <a:t>E</a:t>
                 </a:r>
-                <a:endParaRPr lang="en-US" sz="2400" dirty="0"/>
               </a:p>
             </p:txBody>
           </p:sp>
@@ -14440,7 +14351,6 @@
                   <a:rPr lang="en-US" sz="2400" dirty="0"/>
                   <a:t>F</a:t>
                 </a:r>
-                <a:endParaRPr lang="en-US" sz="2400" dirty="0"/>
               </a:p>
             </p:txBody>
           </p:sp>
@@ -14680,7 +14590,6 @@
                   <a:rPr lang="en-US" sz="2400" dirty="0"/>
                   <a:t>O</a:t>
                 </a:r>
-                <a:endParaRPr lang="en-US" sz="2400" dirty="0"/>
               </a:p>
             </p:txBody>
           </p:sp>
@@ -14920,7 +14829,6 @@
                   <a:rPr lang="en-US" sz="2400" dirty="0"/>
                   <a:t>G</a:t>
                 </a:r>
-                <a:endParaRPr lang="en-US" sz="2400" dirty="0"/>
               </a:p>
             </p:txBody>
           </p:sp>
@@ -15160,7 +15068,6 @@
                   <a:rPr lang="en-US" sz="3733" dirty="0"/>
                   <a:t>H</a:t>
                 </a:r>
-                <a:endParaRPr lang="en-US" sz="3733" dirty="0"/>
               </a:p>
             </p:txBody>
           </p:sp>
@@ -15400,7 +15307,6 @@
                   <a:rPr lang="en-US" sz="3733" dirty="0"/>
                   <a:t>I</a:t>
                 </a:r>
-                <a:endParaRPr lang="en-US" sz="3733" dirty="0"/>
               </a:p>
             </p:txBody>
           </p:sp>
@@ -15640,7 +15546,6 @@
                   <a:rPr lang="en-US" sz="2133" dirty="0"/>
                   <a:t>R</a:t>
                 </a:r>
-                <a:endParaRPr lang="en-US" sz="2133" dirty="0"/>
               </a:p>
             </p:txBody>
           </p:sp>
@@ -15880,7 +15785,6 @@
                   <a:rPr lang="en-US" sz="2133" dirty="0"/>
                   <a:t>N</a:t>
                 </a:r>
-                <a:endParaRPr lang="en-US" sz="2133" dirty="0"/>
               </a:p>
             </p:txBody>
           </p:sp>
@@ -16120,7 +16024,6 @@
                   <a:rPr lang="en-US" sz="5867" dirty="0"/>
                   <a:t>Z</a:t>
                 </a:r>
-                <a:endParaRPr lang="en-US" sz="5867" dirty="0"/>
               </a:p>
             </p:txBody>
           </p:sp>
@@ -16360,7 +16263,6 @@
                   <a:rPr lang="en-US" sz="2133" dirty="0"/>
                   <a:t>J</a:t>
                 </a:r>
-                <a:endParaRPr lang="en-US" sz="2133" dirty="0"/>
               </a:p>
             </p:txBody>
           </p:sp>
@@ -16600,7 +16502,6 @@
                   <a:rPr lang="en-US" sz="2133" dirty="0"/>
                   <a:t>K</a:t>
                 </a:r>
-                <a:endParaRPr lang="en-US" sz="2133" dirty="0"/>
               </a:p>
             </p:txBody>
           </p:sp>
@@ -16840,7 +16741,6 @@
                   <a:rPr lang="en-US" sz="2133" dirty="0"/>
                   <a:t>L</a:t>
                 </a:r>
-                <a:endParaRPr lang="en-US" sz="2133" dirty="0"/>
               </a:p>
             </p:txBody>
           </p:sp>
@@ -17080,7 +16980,6 @@
                   <a:rPr lang="en-US" sz="2133" dirty="0"/>
                   <a:t>M</a:t>
                 </a:r>
-                <a:endParaRPr lang="en-US" sz="2133" dirty="0"/>
               </a:p>
             </p:txBody>
           </p:sp>
@@ -17386,23 +17285,7 @@
                     <a:schemeClr val="tx1"/>
                   </a:solidFill>
                 </a:rPr>
-                <a:t>, C, </a:t>
-              </a:r>
-              <a:r>
-                <a:rPr lang="en-US" sz="2400" dirty="0">
-                  <a:solidFill>
-                    <a:schemeClr val="tx1"/>
-                  </a:solidFill>
-                </a:rPr>
-                <a:t>F</a:t>
-              </a:r>
-              <a:r>
-                <a:rPr lang="en-US" sz="2400" dirty="0">
-                  <a:solidFill>
-                    <a:schemeClr val="tx1"/>
-                  </a:solidFill>
-                </a:rPr>
-                <a:t>, F, J, C, </a:t>
+                <a:t>, C, F, F, J, C, </a:t>
               </a:r>
               <a:r>
                 <a:rPr lang="en-US" sz="2400" dirty="0">
@@ -17418,23 +17301,7 @@
                     <a:schemeClr val="tx1"/>
                   </a:solidFill>
                 </a:rPr>
-                <a:t>, </a:t>
-              </a:r>
-              <a:r>
-                <a:rPr lang="en-US" sz="2400" dirty="0">
-                  <a:solidFill>
-                    <a:schemeClr val="tx1"/>
-                  </a:solidFill>
-                </a:rPr>
-                <a:t>B, </a:t>
-              </a:r>
-              <a:r>
-                <a:rPr lang="en-US" sz="2400" dirty="0">
-                  <a:solidFill>
-                    <a:schemeClr val="tx1"/>
-                  </a:solidFill>
-                </a:rPr>
-                <a:t>… </a:t>
+                <a:t>, B, … </a:t>
               </a:r>
               <a:r>
                 <a:rPr lang="en-US" sz="2400" dirty="0"/>
@@ -17967,7 +17834,6 @@
                 <a:rPr lang="en-US" sz="2400" dirty="0"/>
                 <a:t>B, F }</a:t>
               </a:r>
-              <a:endParaRPr lang="en-US" sz="2400" dirty="0"/>
             </a:p>
           </p:txBody>
         </p:sp>
@@ -18980,7 +18846,6 @@
                 <a:rPr lang="en-US" sz="2400" dirty="0"/>
                 <a:t>D, F, J }</a:t>
               </a:r>
-              <a:endParaRPr lang="en-US" sz="2400" dirty="0"/>
             </a:p>
           </p:txBody>
         </p:sp>
@@ -19240,7 +19105,6 @@
                 <a:rPr lang="en-US" sz="2400" dirty="0"/>
                 <a:t>H, L, E }</a:t>
               </a:r>
-              <a:endParaRPr lang="en-US" sz="2400" dirty="0"/>
             </a:p>
           </p:txBody>
         </p:sp>
@@ -19611,7 +19475,7 @@
         </p:nvSpPr>
         <p:spPr>
           <a:xfrm>
-            <a:off x="24332430" y="22500991"/>
+            <a:off x="74065412" y="26578318"/>
             <a:ext cx="4849479" cy="2958323"/>
           </a:xfrm>
           <a:prstGeom prst="roundRect">
@@ -19651,7 +19515,7 @@
         </p:nvSpPr>
         <p:spPr>
           <a:xfrm>
-            <a:off x="24713068" y="22659813"/>
+            <a:off x="74446050" y="26737140"/>
             <a:ext cx="4241356" cy="1241237"/>
           </a:xfrm>
           <a:prstGeom prst="rect">
@@ -19677,7 +19541,6 @@
               <a:rPr lang="en-US" sz="3733" i="1" dirty="0"/>
               <a:t>Species Estimator: </a:t>
             </a:r>
-            <a:endParaRPr lang="en-US" sz="3733" i="1" dirty="0"/>
           </a:p>
         </p:txBody>
       </p:sp>
@@ -19690,20 +19553,20 @@
           <p:nvPr>
             <p:extLst>
               <p:ext uri="{D42A27DB-BD31-4B8C-83A1-F6EECF244321}">
-                <p14:modId xmlns:p14="http://schemas.microsoft.com/office/powerpoint/2010/main" val="3095424673"/>
+                <p14:modId xmlns:p14="http://schemas.microsoft.com/office/powerpoint/2010/main" val="3891948704"/>
               </p:ext>
             </p:extLst>
           </p:nvPr>
         </p:nvGraphicFramePr>
         <p:xfrm>
-          <a:off x="24799172" y="24109609"/>
+          <a:off x="74532154" y="28186936"/>
           <a:ext cx="3983047" cy="1167444"/>
         </p:xfrm>
         <a:graphic>
           <a:graphicData uri="http://schemas.openxmlformats.org/presentationml/2006/ole">
             <mc:AlternateContent xmlns:mc="http://schemas.openxmlformats.org/markup-compatibility/2006">
               <mc:Choice xmlns:v="urn:schemas-microsoft-com:vml" Requires="v">
-                <p:oleObj spid="_x0000_s1061" name="Equation" r:id="rId14" imgW="1473200" imgH="431800" progId="Equation.3">
+                <p:oleObj spid="_x0000_s1065" name="Equation" r:id="rId14" imgW="1473200" imgH="431800" progId="Equation.3">
                   <p:embed/>
                 </p:oleObj>
               </mc:Choice>
@@ -19724,7 +19587,7 @@
                     </p:blipFill>
                     <p:spPr>
                       <a:xfrm>
-                        <a:off x="24799172" y="24109609"/>
+                        <a:off x="74532154" y="28186936"/>
                         <a:ext cx="3983047" cy="1167444"/>
                       </a:xfrm>
                       <a:prstGeom prst="rect">
@@ -19748,7 +19611,7 @@
         </p:nvCxnSpPr>
         <p:spPr>
           <a:xfrm rot="16200000" flipH="1">
-            <a:off x="22294459" y="18998151"/>
+            <a:off x="72027441" y="23075478"/>
             <a:ext cx="1260626" cy="5745053"/>
           </a:xfrm>
           <a:prstGeom prst="bentConnector4">
@@ -19784,7 +19647,7 @@
         </p:nvSpPr>
         <p:spPr>
           <a:xfrm>
-            <a:off x="19277283" y="20143599"/>
+            <a:off x="69010265" y="24220926"/>
             <a:ext cx="7291760" cy="584775"/>
           </a:xfrm>
           <a:prstGeom prst="rect">
@@ -19803,7 +19666,6 @@
               <a:rPr lang="en-US" sz="3200" i="1" dirty="0"/>
               <a:t>Unknown biological species estimation </a:t>
             </a:r>
-            <a:endParaRPr lang="en-US" sz="3200" i="1" dirty="0"/>
           </a:p>
         </p:txBody>
       </p:sp>
@@ -19817,7 +19679,7 @@
         </p:nvCxnSpPr>
         <p:spPr>
           <a:xfrm rot="16200000" flipH="1" flipV="1">
-            <a:off x="30290121" y="18582998"/>
+            <a:off x="80023103" y="22660325"/>
             <a:ext cx="1362618" cy="6473368"/>
           </a:xfrm>
           <a:prstGeom prst="bentConnector4">
@@ -19853,7 +19715,7 @@
         </p:nvSpPr>
         <p:spPr>
           <a:xfrm>
-            <a:off x="27351090" y="20110825"/>
+            <a:off x="77084072" y="24188152"/>
             <a:ext cx="7291760" cy="584775"/>
           </a:xfrm>
           <a:prstGeom prst="rect">
@@ -19888,7 +19750,7 @@
         </p:nvSpPr>
         <p:spPr>
           <a:xfrm>
-            <a:off x="22923164" y="25527407"/>
+            <a:off x="72656146" y="29604734"/>
             <a:ext cx="7635401" cy="584775"/>
           </a:xfrm>
           <a:prstGeom prst="rect">
@@ -19911,11 +19773,6 @@
               </a:rPr>
               <a:t>* Requires sampling with replacement</a:t>
             </a:r>
-            <a:endParaRPr lang="en-US" sz="3200" dirty="0">
-              <a:solidFill>
-                <a:srgbClr val="FF0000"/>
-              </a:solidFill>
-            </a:endParaRPr>
           </a:p>
         </p:txBody>
       </p:sp>
@@ -19927,7 +19784,7 @@
         </p:nvSpPr>
         <p:spPr>
           <a:xfrm>
-            <a:off x="16912979" y="29071129"/>
+            <a:off x="66645961" y="33148456"/>
             <a:ext cx="21079657" cy="2308324"/>
           </a:xfrm>
           <a:prstGeom prst="rect">
@@ -19980,7 +19837,7 @@
         </p:nvSpPr>
         <p:spPr>
           <a:xfrm>
-            <a:off x="15380315" y="44854194"/>
+            <a:off x="65113297" y="48931521"/>
             <a:ext cx="12913984" cy="666786"/>
           </a:xfrm>
           <a:prstGeom prst="rect">
@@ -19997,17 +19854,8 @@
             <a:pPr algn="ctr"/>
             <a:r>
               <a:rPr lang="en-US" sz="3733" i="1" dirty="0"/>
-              <a:t>Fig. </a:t>
+              <a:t>Fig. simulation result for U.S. states GDP sum</a:t>
             </a:r>
-            <a:r>
-              <a:rPr lang="en-US" sz="3733" i="1" dirty="0"/>
-              <a:t>s</a:t>
-            </a:r>
-            <a:r>
-              <a:rPr lang="en-US" sz="3733" i="1" dirty="0"/>
-              <a:t>imulation result for U.S. states GDP sum</a:t>
-            </a:r>
-            <a:endParaRPr lang="en-US" sz="3733" i="1" dirty="0"/>
           </a:p>
         </p:txBody>
       </p:sp>
@@ -20019,7 +19867,7 @@
         </p:nvSpPr>
         <p:spPr>
           <a:xfrm>
-            <a:off x="-8423879" y="45711996"/>
+            <a:off x="41309103" y="49789323"/>
             <a:ext cx="21079657" cy="2308324"/>
           </a:xfrm>
           <a:prstGeom prst="rect">
@@ -20060,7 +19908,7 @@
         </p:nvSpPr>
         <p:spPr>
           <a:xfrm>
-            <a:off x="16785147" y="46345696"/>
+            <a:off x="66518129" y="50423023"/>
             <a:ext cx="21079657" cy="1200329"/>
           </a:xfrm>
           <a:prstGeom prst="rect">
@@ -20081,15 +19929,7 @@
             </a:pPr>
             <a:r>
               <a:rPr lang="en-US" sz="4800" i="1" dirty="0"/>
-              <a:t>How can we estimate the values of the unknown data items </a:t>
-            </a:r>
-            <a:r>
-              <a:rPr lang="en-US" sz="4800" i="1" dirty="0"/>
-              <a:t>more </a:t>
-            </a:r>
-            <a:r>
-              <a:rPr lang="en-US" sz="4800" i="1" dirty="0"/>
-              <a:t>precisely?</a:t>
+              <a:t>How can we estimate the values of the unknown data items more precisely?</a:t>
             </a:r>
           </a:p>
         </p:txBody>
@@ -20103,14 +19943,14 @@
           <p:nvPr>
             <p:extLst>
               <p:ext uri="{D42A27DB-BD31-4B8C-83A1-F6EECF244321}">
-                <p14:modId xmlns:p14="http://schemas.microsoft.com/office/powerpoint/2010/main" val="815472348"/>
+                <p14:modId xmlns:p14="http://schemas.microsoft.com/office/powerpoint/2010/main" val="877045205"/>
               </p:ext>
             </p:extLst>
           </p:nvPr>
         </p:nvGraphicFramePr>
         <p:xfrm>
-          <a:off x="272327" y="5394350"/>
-          <a:ext cx="27685984" cy="3078480"/>
+          <a:off x="495847" y="4662830"/>
+          <a:ext cx="27685984" cy="1871080"/>
         </p:xfrm>
         <a:graphic>
           <a:graphicData uri="http://schemas.openxmlformats.org/drawingml/2006/table">
@@ -20124,7 +19964,7 @@
                 <a:gridCol w="6921496"/>
                 <a:gridCol w="6921496"/>
               </a:tblGrid>
-              <a:tr h="370840">
+              <a:tr h="700010">
                 <a:tc>
                   <a:txBody>
                     <a:bodyPr/>
@@ -20159,12 +19999,19 @@
                           <a:latin typeface="Trebuchet MS"/>
                           <a:cs typeface="Trebuchet MS"/>
                         </a:rPr>
-                        <a:t> Chung</a:t>
+                        <a:t> </a:t>
                       </a:r>
-                    </a:p>
-                    <a:p>
-                      <a:pPr algn="ctr"/>
-                      <a:endParaRPr lang="en-US" sz="6000" dirty="0"/>
+                      <a:r>
+                        <a:rPr lang="en-US" sz="5400" dirty="0" smtClean="0">
+                          <a:latin typeface="Trebuchet MS"/>
+                          <a:cs typeface="Trebuchet MS"/>
+                        </a:rPr>
+                        <a:t>Chung</a:t>
+                      </a:r>
+                      <a:endParaRPr lang="en-US" sz="5400" dirty="0" smtClean="0">
+                        <a:latin typeface="Trebuchet MS"/>
+                        <a:cs typeface="Trebuchet MS"/>
+                      </a:endParaRPr>
                     </a:p>
                   </a:txBody>
                   <a:tcPr>
@@ -20174,8 +20021,12 @@
                     <a:lnR w="12700" cmpd="sng">
                       <a:noFill/>
                     </a:lnR>
-                    <a:lnT w="12700" cmpd="sng">
+                    <a:lnT w="12700" cap="flat" cmpd="sng" algn="ctr">
                       <a:noFill/>
+                      <a:prstDash val="solid"/>
+                      <a:round/>
+                      <a:headEnd type="none" w="med" len="med"/>
+                      <a:tailEnd type="none" w="med" len="med"/>
                     </a:lnT>
                     <a:lnB w="12700" cmpd="sng">
                       <a:noFill/>
@@ -20224,8 +20075,12 @@
                     <a:lnR w="12700" cmpd="sng">
                       <a:noFill/>
                     </a:lnR>
-                    <a:lnT w="12700" cmpd="sng">
+                    <a:lnT w="12700" cap="flat" cmpd="sng" algn="ctr">
                       <a:noFill/>
+                      <a:prstDash val="solid"/>
+                      <a:round/>
+                      <a:headEnd type="none" w="med" len="med"/>
+                      <a:tailEnd type="none" w="med" len="med"/>
                     </a:lnT>
                     <a:lnB w="12700" cmpd="sng">
                       <a:noFill/>
@@ -20267,8 +20122,12 @@
                     <a:lnR w="12700" cmpd="sng">
                       <a:noFill/>
                     </a:lnR>
-                    <a:lnT w="12700" cmpd="sng">
+                    <a:lnT w="12700" cap="flat" cmpd="sng" algn="ctr">
                       <a:noFill/>
+                      <a:prstDash val="solid"/>
+                      <a:round/>
+                      <a:headEnd type="none" w="med" len="med"/>
+                      <a:tailEnd type="none" w="med" len="med"/>
                     </a:lnT>
                     <a:lnB w="12700" cmpd="sng">
                       <a:noFill/>
@@ -20324,8 +20183,12 @@
                     <a:lnR w="12700" cmpd="sng">
                       <a:noFill/>
                     </a:lnR>
-                    <a:lnT w="12700" cmpd="sng">
+                    <a:lnT w="12700" cap="flat" cmpd="sng" algn="ctr">
                       <a:noFill/>
+                      <a:prstDash val="solid"/>
+                      <a:round/>
+                      <a:headEnd type="none" w="med" len="med"/>
+                      <a:tailEnd type="none" w="med" len="med"/>
                     </a:lnT>
                     <a:lnB w="12700" cmpd="sng">
                       <a:noFill/>
@@ -20342,7 +20205,7 @@
                   </a:tcPr>
                 </a:tc>
               </a:tr>
-              <a:tr h="370840">
+              <a:tr h="956680">
                 <a:tc>
                   <a:txBody>
                     <a:bodyPr/>
@@ -20353,6 +20216,7 @@
                         <a:rPr lang="en-US" sz="3600" dirty="0" smtClean="0">
                           <a:latin typeface="Trebuchet MS"/>
                           <a:cs typeface="Trebuchet MS"/>
+                          <a:hlinkClick r:id="rId16"/>
                         </a:rPr>
                         <a:t>yeounoh_chung@brown.edu</a:t>
                       </a:r>
@@ -20369,7 +20233,7 @@
                     <a:lnT w="12700" cmpd="sng">
                       <a:noFill/>
                     </a:lnT>
-                    <a:lnB w="57150" cap="flat" cmpd="sng" algn="ctr">
+                    <a:lnB w="12700" cap="flat" cmpd="sng" algn="ctr">
                       <a:solidFill>
                         <a:schemeClr val="tx1"/>
                       </a:solidFill>
@@ -20415,13 +20279,14 @@
                         <a:rPr lang="en-US" sz="3600" dirty="0" smtClean="0">
                           <a:latin typeface="Trebuchet MS"/>
                           <a:cs typeface="Trebuchet MS"/>
+                          <a:hlinkClick r:id="rId17"/>
                         </a:rPr>
                         <a:t>Scott_houde@brown.edu</a:t>
                       </a:r>
-                    </a:p>
-                    <a:p>
-                      <a:pPr algn="ctr"/>
-                      <a:endParaRPr lang="en-US" sz="4000" dirty="0"/>
+                      <a:endParaRPr lang="en-US" sz="3600" dirty="0" smtClean="0">
+                        <a:latin typeface="Trebuchet MS"/>
+                        <a:cs typeface="Trebuchet MS"/>
+                      </a:endParaRPr>
                     </a:p>
                   </a:txBody>
                   <a:tcPr>
@@ -20434,7 +20299,7 @@
                     <a:lnT w="12700" cmpd="sng">
                       <a:noFill/>
                     </a:lnT>
-                    <a:lnB w="57150" cap="flat" cmpd="sng" algn="ctr">
+                    <a:lnB w="12700" cap="flat" cmpd="sng" algn="ctr">
                       <a:solidFill>
                         <a:schemeClr val="tx1"/>
                       </a:solidFill>
@@ -20480,13 +20345,14 @@
                         <a:rPr lang="en-US" sz="3600" dirty="0" smtClean="0">
                           <a:latin typeface="Trebuchet MS"/>
                           <a:cs typeface="Trebuchet MS"/>
+                          <a:hlinkClick r:id="rId18"/>
                         </a:rPr>
                         <a:t>Johannes_novotny@brown.edu</a:t>
                       </a:r>
-                    </a:p>
-                    <a:p>
-                      <a:pPr algn="ctr"/>
-                      <a:endParaRPr lang="en-US" sz="4000" dirty="0"/>
+                      <a:endParaRPr lang="en-US" sz="3600" dirty="0" smtClean="0">
+                        <a:latin typeface="Trebuchet MS"/>
+                        <a:cs typeface="Trebuchet MS"/>
+                      </a:endParaRPr>
                     </a:p>
                   </a:txBody>
                   <a:tcPr>
@@ -20499,7 +20365,7 @@
                     <a:lnT w="12700" cmpd="sng">
                       <a:noFill/>
                     </a:lnT>
-                    <a:lnB w="57150" cap="flat" cmpd="sng" algn="ctr">
+                    <a:lnB w="12700" cap="flat" cmpd="sng" algn="ctr">
                       <a:solidFill>
                         <a:schemeClr val="tx1"/>
                       </a:solidFill>
@@ -20545,13 +20411,14 @@
                         <a:rPr lang="en-US" sz="3600" dirty="0" smtClean="0">
                           <a:latin typeface="Trebuchet MS"/>
                           <a:cs typeface="Trebuchet MS"/>
+                          <a:hlinkClick r:id="rId19"/>
                         </a:rPr>
                         <a:t>Erfan_zamanian@brown.edu</a:t>
                       </a:r>
-                    </a:p>
-                    <a:p>
-                      <a:pPr algn="ctr"/>
-                      <a:endParaRPr lang="en-US" sz="3600" dirty="0"/>
+                      <a:endParaRPr lang="en-US" sz="3600" dirty="0" smtClean="0">
+                        <a:latin typeface="Trebuchet MS"/>
+                        <a:cs typeface="Trebuchet MS"/>
+                      </a:endParaRPr>
                     </a:p>
                   </a:txBody>
                   <a:tcPr>
@@ -20564,7 +20431,7 @@
                     <a:lnT w="12700" cmpd="sng">
                       <a:noFill/>
                     </a:lnT>
-                    <a:lnB w="57150" cap="flat" cmpd="sng" algn="ctr">
+                    <a:lnB w="12700" cap="flat" cmpd="sng" algn="ctr">
                       <a:solidFill>
                         <a:schemeClr val="tx1"/>
                       </a:solidFill>
@@ -20589,6 +20456,189 @@
           </a:graphicData>
         </a:graphic>
       </p:graphicFrame>
+      <p:cxnSp>
+        <p:nvCxnSpPr>
+          <p:cNvPr id="11" name="Straight Connector 10"/>
+          <p:cNvCxnSpPr/>
+          <p:nvPr/>
+        </p:nvCxnSpPr>
+        <p:spPr>
+          <a:xfrm>
+            <a:off x="495847" y="6604000"/>
+            <a:ext cx="27685984" cy="0"/>
+          </a:xfrm>
+          <a:prstGeom prst="line">
+            <a:avLst/>
+          </a:prstGeom>
+        </p:spPr>
+        <p:style>
+          <a:lnRef idx="2">
+            <a:schemeClr val="accent2"/>
+          </a:lnRef>
+          <a:fillRef idx="0">
+            <a:schemeClr val="accent2"/>
+          </a:fillRef>
+          <a:effectRef idx="1">
+            <a:schemeClr val="accent2"/>
+          </a:effectRef>
+          <a:fontRef idx="minor">
+            <a:schemeClr val="tx1"/>
+          </a:fontRef>
+        </p:style>
+      </p:cxnSp>
+      <p:sp>
+        <p:nvSpPr>
+          <p:cNvPr id="12" name="TextBox 11"/>
+          <p:cNvSpPr txBox="1"/>
+          <p:nvPr/>
+        </p:nvSpPr>
+        <p:spPr>
+          <a:xfrm>
+            <a:off x="495847" y="6807200"/>
+            <a:ext cx="27685984" cy="1569660"/>
+          </a:xfrm>
+          <a:prstGeom prst="rect">
+            <a:avLst/>
+          </a:prstGeom>
+          <a:noFill/>
+        </p:spPr>
+        <p:txBody>
+          <a:bodyPr wrap="square" rtlCol="0">
+            <a:spAutoFit/>
+          </a:bodyPr>
+          <a:lstStyle/>
+          <a:p>
+            <a:pPr algn="ctr"/>
+            <a:r>
+              <a:rPr lang="en-US" sz="4800" u="sng" dirty="0" smtClean="0"/>
+              <a:t>Goal: </a:t>
+            </a:r>
+            <a:r>
+              <a:rPr lang="en-US" sz="4800" dirty="0" smtClean="0"/>
+              <a:t> To create an easy to use web based search tool that combines three major data sets that allows prospective doctoral applicants to find the right computer science professor and university for them.</a:t>
+            </a:r>
+            <a:endParaRPr lang="en-US" sz="4800" u="sng" dirty="0"/>
+          </a:p>
+        </p:txBody>
+      </p:sp>
+      <p:sp>
+        <p:nvSpPr>
+          <p:cNvPr id="15" name="Rounded Rectangle 14"/>
+          <p:cNvSpPr/>
+          <p:nvPr/>
+        </p:nvSpPr>
+        <p:spPr>
+          <a:xfrm>
+            <a:off x="495847" y="8656320"/>
+            <a:ext cx="27685984" cy="2479040"/>
+          </a:xfrm>
+          <a:prstGeom prst="roundRect">
+            <a:avLst/>
+          </a:prstGeom>
+        </p:spPr>
+        <p:style>
+          <a:lnRef idx="1">
+            <a:schemeClr val="accent1"/>
+          </a:lnRef>
+          <a:fillRef idx="3">
+            <a:schemeClr val="accent1"/>
+          </a:fillRef>
+          <a:effectRef idx="2">
+            <a:schemeClr val="accent1"/>
+          </a:effectRef>
+          <a:fontRef idx="minor">
+            <a:schemeClr val="lt1"/>
+          </a:fontRef>
+        </p:style>
+        <p:txBody>
+          <a:bodyPr rtlCol="0" anchor="ctr"/>
+          <a:lstStyle/>
+          <a:p>
+            <a:pPr algn="ctr"/>
+            <a:endParaRPr lang="en-US"/>
+          </a:p>
+        </p:txBody>
+      </p:sp>
+      <p:sp>
+        <p:nvSpPr>
+          <p:cNvPr id="157" name="Rounded Rectangle 156"/>
+          <p:cNvSpPr/>
+          <p:nvPr/>
+        </p:nvSpPr>
+        <p:spPr>
+          <a:xfrm>
+            <a:off x="2479039" y="11785600"/>
+            <a:ext cx="24808711" cy="2479040"/>
+          </a:xfrm>
+          <a:prstGeom prst="roundRect">
+            <a:avLst/>
+          </a:prstGeom>
+        </p:spPr>
+        <p:style>
+          <a:lnRef idx="1">
+            <a:schemeClr val="accent1"/>
+          </a:lnRef>
+          <a:fillRef idx="3">
+            <a:schemeClr val="accent1"/>
+          </a:fillRef>
+          <a:effectRef idx="2">
+            <a:schemeClr val="accent1"/>
+          </a:effectRef>
+          <a:fontRef idx="minor">
+            <a:schemeClr val="lt1"/>
+          </a:fontRef>
+        </p:style>
+        <p:txBody>
+          <a:bodyPr rtlCol="0" anchor="ctr"/>
+          <a:lstStyle/>
+          <a:p>
+            <a:pPr algn="ctr"/>
+            <a:endParaRPr lang="en-US"/>
+          </a:p>
+        </p:txBody>
+      </p:sp>
+      <p:sp>
+        <p:nvSpPr>
+          <p:cNvPr id="17" name="Bent Arrow 16"/>
+          <p:cNvSpPr/>
+          <p:nvPr/>
+        </p:nvSpPr>
+        <p:spPr>
+          <a:xfrm rot="10800000" flipH="1">
+            <a:off x="833120" y="11414820"/>
+            <a:ext cx="1471206" cy="2118300"/>
+          </a:xfrm>
+          <a:prstGeom prst="bentArrow">
+            <a:avLst/>
+          </a:prstGeom>
+        </p:spPr>
+        <p:style>
+          <a:lnRef idx="1">
+            <a:schemeClr val="accent1"/>
+          </a:lnRef>
+          <a:fillRef idx="3">
+            <a:schemeClr val="accent1"/>
+          </a:fillRef>
+          <a:effectRef idx="2">
+            <a:schemeClr val="accent1"/>
+          </a:effectRef>
+          <a:fontRef idx="minor">
+            <a:schemeClr val="lt1"/>
+          </a:fontRef>
+        </p:style>
+        <p:txBody>
+          <a:bodyPr rtlCol="0" anchor="ctr"/>
+          <a:lstStyle/>
+          <a:p>
+            <a:pPr algn="ctr"/>
+            <a:endParaRPr lang="en-US">
+              <a:solidFill>
+                <a:schemeClr val="tx1"/>
+              </a:solidFill>
+            </a:endParaRPr>
+          </a:p>
+        </p:txBody>
+      </p:sp>
     </p:spTree>
     <p:extLst>
       <p:ext uri="{BB962C8B-B14F-4D97-AF65-F5344CB8AC3E}">

</xml_diff>